<commit_message>
Update of Tableau assignment 3
</commit_message>
<xml_diff>
--- a/Tableau_&_PowerBI/INFS 776 - Data Visualization/Assignments/Project - Storyboard - Gavin Gunawardena.pptx
+++ b/Tableau_&_PowerBI/INFS 776 - Data Visualization/Assignments/Project - Storyboard - Gavin Gunawardena.pptx
@@ -3317,6 +3317,14 @@
 <file path=ppt/slides/slide1.xml><?xml version="1.0" encoding="utf-8"?>
 <p:sld xmlns:a="http://schemas.openxmlformats.org/drawingml/2006/main" xmlns:r="http://schemas.openxmlformats.org/officeDocument/2006/relationships" xmlns:p="http://schemas.openxmlformats.org/presentationml/2006/main">
   <p:cSld>
+    <p:bg>
+      <p:bgPr>
+        <a:solidFill>
+          <a:schemeClr val="bg1"/>
+        </a:solidFill>
+        <a:effectLst/>
+      </p:bgPr>
+    </p:bg>
     <p:spTree>
       <p:nvGrpSpPr>
         <p:cNvPr id="1" name=""/>
@@ -3331,71 +3339,766 @@
           <a:chExt cx="0" cy="0"/>
         </a:xfrm>
       </p:grpSpPr>
-      <p:sp>
-        <p:nvSpPr>
-          <p:cNvPr id="2" name="slide1">
-            <a:extLst>
-              <a:ext uri="{FF2B5EF4-FFF2-40B4-BE49-F238E27FC236}">
-                <a16:creationId xmlns:a16="http://schemas.microsoft.com/office/drawing/2014/main" id="{C3F74F36-505C-422A-A477-054D7B340C57}"/>
-              </a:ext>
-            </a:extLst>
-          </p:cNvPr>
-          <p:cNvSpPr>
-            <a:spLocks noGrp="1"/>
-          </p:cNvSpPr>
-          <p:nvPr>
-            <p:ph type="ctrTitle"/>
-          </p:nvPr>
-        </p:nvSpPr>
-        <p:spPr/>
-        <p:txBody>
-          <a:bodyPr/>
-          <a:lstStyle/>
-          <a:p>
-            <a:r>
-              <a:rPr lang="en-US" dirty="0"/>
-              <a:t>Employment Dataset Project</a:t>
-            </a:r>
-            <a:br>
-              <a:rPr lang="en-US" dirty="0"/>
-            </a:br>
-            <a:r>
-              <a:rPr lang="en-US" dirty="0"/>
-              <a:t>Storyboard</a:t>
-            </a:r>
-            <a:endParaRPr dirty="0"/>
-          </a:p>
-        </p:txBody>
-      </p:sp>
-      <p:sp>
-        <p:nvSpPr>
-          <p:cNvPr id="3" name="slide1">
-            <a:extLst>
-              <a:ext uri="{FF2B5EF4-FFF2-40B4-BE49-F238E27FC236}">
-                <a16:creationId xmlns:a16="http://schemas.microsoft.com/office/drawing/2014/main" id="{EDD8FF16-F33D-43E6-BEA9-AE1F7310ECC5}"/>
-              </a:ext>
-            </a:extLst>
-          </p:cNvPr>
-          <p:cNvSpPr>
-            <a:spLocks noGrp="1"/>
-          </p:cNvSpPr>
-          <p:nvPr>
-            <p:ph type="subTitle" idx="1"/>
-          </p:nvPr>
-        </p:nvSpPr>
-        <p:spPr/>
-        <p:txBody>
-          <a:bodyPr/>
-          <a:lstStyle/>
-          <a:p>
-            <a:r>
-              <a:rPr lang="en-US" dirty="0"/>
-              <a:t>By Gavin Gunawardena</a:t>
-            </a:r>
-            <a:endParaRPr dirty="0"/>
-          </a:p>
-        </p:txBody>
-      </p:sp>
+      <p:sp useBgFill="1">
+        <p:nvSpPr>
+          <p:cNvPr id="23" name="Rectangle 22">
+            <a:extLst>
+              <a:ext uri="{FF2B5EF4-FFF2-40B4-BE49-F238E27FC236}">
+                <a16:creationId xmlns:a16="http://schemas.microsoft.com/office/drawing/2014/main" id="{2D2B266D-3625-4584-A5C3-7D3F672CFF30}"/>
+              </a:ext>
+              <a:ext uri="{C183D7F6-B498-43B3-948B-1728B52AA6E4}">
+                <adec:decorative xmlns:adec="http://schemas.microsoft.com/office/drawing/2017/decorative" val="1"/>
+              </a:ext>
+            </a:extLst>
+          </p:cNvPr>
+          <p:cNvSpPr>
+            <a:spLocks noGrp="1" noRot="1" noChangeAspect="1" noMove="1" noResize="1" noEditPoints="1" noAdjustHandles="1" noChangeArrowheads="1" noChangeShapeType="1" noTextEdit="1"/>
+          </p:cNvSpPr>
+          <p:nvPr>
+            <p:extLst>
+              <p:ext uri="{386F3935-93C4-4BCD-93E2-E3B085C9AB24}">
+                <p16:designElem xmlns:p16="http://schemas.microsoft.com/office/powerpoint/2015/main" val="1"/>
+              </p:ext>
+            </p:extLst>
+          </p:nvPr>
+        </p:nvSpPr>
+        <p:spPr>
+          <a:xfrm>
+            <a:off x="0" y="0"/>
+            <a:ext cx="12188952" cy="6858000"/>
+          </a:xfrm>
+          <a:prstGeom prst="rect">
+            <a:avLst/>
+          </a:prstGeom>
+          <a:ln>
+            <a:noFill/>
+          </a:ln>
+        </p:spPr>
+        <p:style>
+          <a:lnRef idx="2">
+            <a:schemeClr val="accent1">
+              <a:shade val="50000"/>
+            </a:schemeClr>
+          </a:lnRef>
+          <a:fillRef idx="1">
+            <a:schemeClr val="accent1"/>
+          </a:fillRef>
+          <a:effectRef idx="0">
+            <a:schemeClr val="accent1"/>
+          </a:effectRef>
+          <a:fontRef idx="minor">
+            <a:schemeClr val="lt1"/>
+          </a:fontRef>
+        </p:style>
+        <p:txBody>
+          <a:bodyPr rtlCol="0" anchor="ctr"/>
+          <a:lstStyle/>
+          <a:p>
+            <a:pPr algn="ctr"/>
+            <a:endParaRPr lang="en-US"/>
+          </a:p>
+        </p:txBody>
+      </p:sp>
+      <p:sp>
+        <p:nvSpPr>
+          <p:cNvPr id="25" name="Rectangle 24">
+            <a:extLst>
+              <a:ext uri="{FF2B5EF4-FFF2-40B4-BE49-F238E27FC236}">
+                <a16:creationId xmlns:a16="http://schemas.microsoft.com/office/drawing/2014/main" id="{C463B99A-73EE-4FBB-B7C4-F9F9BCC25C65}"/>
+              </a:ext>
+              <a:ext uri="{C183D7F6-B498-43B3-948B-1728B52AA6E4}">
+                <adec:decorative xmlns:adec="http://schemas.microsoft.com/office/drawing/2017/decorative" val="1"/>
+              </a:ext>
+            </a:extLst>
+          </p:cNvPr>
+          <p:cNvSpPr>
+            <a:spLocks noGrp="1" noRot="1" noChangeAspect="1" noMove="1" noResize="1" noEditPoints="1" noAdjustHandles="1" noChangeArrowheads="1" noChangeShapeType="1" noTextEdit="1"/>
+          </p:cNvSpPr>
+          <p:nvPr>
+            <p:extLst>
+              <p:ext uri="{386F3935-93C4-4BCD-93E2-E3B085C9AB24}">
+                <p16:designElem xmlns:p16="http://schemas.microsoft.com/office/powerpoint/2015/main" val="1"/>
+              </p:ext>
+            </p:extLst>
+          </p:nvPr>
+        </p:nvSpPr>
+        <p:spPr>
+          <a:xfrm>
+            <a:off x="0" y="0"/>
+            <a:ext cx="12188952" cy="6858000"/>
+          </a:xfrm>
+          <a:prstGeom prst="rect">
+            <a:avLst/>
+          </a:prstGeom>
+          <a:solidFill>
+            <a:schemeClr val="accent2"/>
+          </a:solidFill>
+          <a:ln>
+            <a:noFill/>
+          </a:ln>
+        </p:spPr>
+        <p:style>
+          <a:lnRef idx="2">
+            <a:schemeClr val="accent1">
+              <a:shade val="50000"/>
+            </a:schemeClr>
+          </a:lnRef>
+          <a:fillRef idx="1">
+            <a:schemeClr val="accent1"/>
+          </a:fillRef>
+          <a:effectRef idx="0">
+            <a:schemeClr val="accent1"/>
+          </a:effectRef>
+          <a:fontRef idx="minor">
+            <a:schemeClr val="lt1"/>
+          </a:fontRef>
+        </p:style>
+        <p:txBody>
+          <a:bodyPr rtlCol="0" anchor="ctr"/>
+          <a:lstStyle/>
+          <a:p>
+            <a:pPr algn="ctr"/>
+            <a:endParaRPr lang="en-US"/>
+          </a:p>
+        </p:txBody>
+      </p:sp>
+      <p:sp>
+        <p:nvSpPr>
+          <p:cNvPr id="27" name="Freeform: Shape 26">
+            <a:extLst>
+              <a:ext uri="{FF2B5EF4-FFF2-40B4-BE49-F238E27FC236}">
+                <a16:creationId xmlns:a16="http://schemas.microsoft.com/office/drawing/2014/main" id="{A5D2A5D1-BA0D-47D3-B051-DA7743C46E28}"/>
+              </a:ext>
+              <a:ext uri="{C183D7F6-B498-43B3-948B-1728B52AA6E4}">
+                <adec:decorative xmlns:adec="http://schemas.microsoft.com/office/drawing/2017/decorative" val="1"/>
+              </a:ext>
+            </a:extLst>
+          </p:cNvPr>
+          <p:cNvSpPr>
+            <a:spLocks noGrp="1" noRot="1" noChangeAspect="1" noMove="1" noResize="1" noEditPoints="1" noAdjustHandles="1" noChangeArrowheads="1" noChangeShapeType="1" noTextEdit="1"/>
+          </p:cNvSpPr>
+          <p:nvPr>
+            <p:extLst>
+              <p:ext uri="{386F3935-93C4-4BCD-93E2-E3B085C9AB24}">
+                <p16:designElem xmlns:p16="http://schemas.microsoft.com/office/powerpoint/2015/main" val="1"/>
+              </p:ext>
+            </p:extLst>
+          </p:nvPr>
+        </p:nvSpPr>
+        <p:spPr>
+          <a:xfrm>
+            <a:off x="0" y="0"/>
+            <a:ext cx="12192000" cy="6219825"/>
+          </a:xfrm>
+          <a:custGeom>
+            <a:avLst/>
+            <a:gdLst>
+              <a:gd name="connsiteX0" fmla="*/ 6789701 w 12192000"/>
+              <a:gd name="connsiteY0" fmla="*/ 6151588 h 6219825"/>
+              <a:gd name="connsiteX1" fmla="*/ 6788702 w 12192000"/>
+              <a:gd name="connsiteY1" fmla="*/ 6151666 h 6219825"/>
+              <a:gd name="connsiteX2" fmla="*/ 6788476 w 12192000"/>
+              <a:gd name="connsiteY2" fmla="*/ 6152200 h 6219825"/>
+              <a:gd name="connsiteX3" fmla="*/ 9834 w 12192000"/>
+              <a:gd name="connsiteY3" fmla="*/ 0 h 6219825"/>
+              <a:gd name="connsiteX4" fmla="*/ 12357 w 12192000"/>
+              <a:gd name="connsiteY4" fmla="*/ 1 h 6219825"/>
+              <a:gd name="connsiteX5" fmla="*/ 12192000 w 12192000"/>
+              <a:gd name="connsiteY5" fmla="*/ 1 h 6219825"/>
+              <a:gd name="connsiteX6" fmla="*/ 12192000 w 12192000"/>
+              <a:gd name="connsiteY6" fmla="*/ 5105401 h 6219825"/>
+              <a:gd name="connsiteX7" fmla="*/ 12191716 w 12192000"/>
+              <a:gd name="connsiteY7" fmla="*/ 5105401 h 6219825"/>
+              <a:gd name="connsiteX8" fmla="*/ 12192000 w 12192000"/>
+              <a:gd name="connsiteY8" fmla="*/ 5256977 h 6219825"/>
+              <a:gd name="connsiteX9" fmla="*/ 12061096 w 12192000"/>
+              <a:gd name="connsiteY9" fmla="*/ 5296034 h 6219825"/>
+              <a:gd name="connsiteX10" fmla="*/ 11676800 w 12192000"/>
+              <a:gd name="connsiteY10" fmla="*/ 5399652 h 6219825"/>
+              <a:gd name="connsiteX11" fmla="*/ 10425355 w 12192000"/>
+              <a:gd name="connsiteY11" fmla="*/ 5683310 h 6219825"/>
+              <a:gd name="connsiteX12" fmla="*/ 9424022 w 12192000"/>
+              <a:gd name="connsiteY12" fmla="*/ 5858546 h 6219825"/>
+              <a:gd name="connsiteX13" fmla="*/ 8458419 w 12192000"/>
+              <a:gd name="connsiteY13" fmla="*/ 5992303 h 6219825"/>
+              <a:gd name="connsiteX14" fmla="*/ 7715970 w 12192000"/>
+              <a:gd name="connsiteY14" fmla="*/ 6072283 h 6219825"/>
+              <a:gd name="connsiteX15" fmla="*/ 6951716 w 12192000"/>
+              <a:gd name="connsiteY15" fmla="*/ 6138091 h 6219825"/>
+              <a:gd name="connsiteX16" fmla="*/ 6936303 w 12192000"/>
+              <a:gd name="connsiteY16" fmla="*/ 6140163 h 6219825"/>
+              <a:gd name="connsiteX17" fmla="*/ 6790448 w 12192000"/>
+              <a:gd name="connsiteY17" fmla="*/ 6151529 h 6219825"/>
+              <a:gd name="connsiteX18" fmla="*/ 6799941 w 12192000"/>
+              <a:gd name="connsiteY18" fmla="*/ 6153349 h 6219825"/>
+              <a:gd name="connsiteX19" fmla="*/ 6835432 w 12192000"/>
+              <a:gd name="connsiteY19" fmla="*/ 6151642 h 6219825"/>
+              <a:gd name="connsiteX20" fmla="*/ 6884003 w 12192000"/>
+              <a:gd name="connsiteY20" fmla="*/ 6148662 h 6219825"/>
+              <a:gd name="connsiteX21" fmla="*/ 7578771 w 12192000"/>
+              <a:gd name="connsiteY21" fmla="*/ 6116122 h 6219825"/>
+              <a:gd name="connsiteX22" fmla="*/ 8623845 w 12192000"/>
+              <a:gd name="connsiteY22" fmla="*/ 6029188 h 6219825"/>
+              <a:gd name="connsiteX23" fmla="*/ 9479970 w 12192000"/>
+              <a:gd name="connsiteY23" fmla="*/ 5925239 h 6219825"/>
+              <a:gd name="connsiteX24" fmla="*/ 10629308 w 12192000"/>
+              <a:gd name="connsiteY24" fmla="*/ 5731000 h 6219825"/>
+              <a:gd name="connsiteX25" fmla="*/ 11998498 w 12192000"/>
+              <a:gd name="connsiteY25" fmla="*/ 5404869 h 6219825"/>
+              <a:gd name="connsiteX26" fmla="*/ 12192000 w 12192000"/>
+              <a:gd name="connsiteY26" fmla="*/ 5347846 h 6219825"/>
+              <a:gd name="connsiteX27" fmla="*/ 12192000 w 12192000"/>
+              <a:gd name="connsiteY27" fmla="*/ 5402606 h 6219825"/>
+              <a:gd name="connsiteX28" fmla="*/ 11829257 w 12192000"/>
+              <a:gd name="connsiteY28" fmla="*/ 5507950 h 6219825"/>
+              <a:gd name="connsiteX29" fmla="*/ 10939183 w 12192000"/>
+              <a:gd name="connsiteY29" fmla="*/ 5722555 h 6219825"/>
+              <a:gd name="connsiteX30" fmla="*/ 9985530 w 12192000"/>
+              <a:gd name="connsiteY30" fmla="*/ 5902635 h 6219825"/>
+              <a:gd name="connsiteX31" fmla="*/ 9186882 w 12192000"/>
+              <a:gd name="connsiteY31" fmla="*/ 6018631 h 6219825"/>
+              <a:gd name="connsiteX32" fmla="*/ 8578198 w 12192000"/>
+              <a:gd name="connsiteY32" fmla="*/ 6088179 h 6219825"/>
+              <a:gd name="connsiteX33" fmla="*/ 7864358 w 12192000"/>
+              <a:gd name="connsiteY33" fmla="*/ 6149656 h 6219825"/>
+              <a:gd name="connsiteX34" fmla="*/ 6935502 w 12192000"/>
+              <a:gd name="connsiteY34" fmla="*/ 6201071 h 6219825"/>
+              <a:gd name="connsiteX35" fmla="*/ 6477750 w 12192000"/>
+              <a:gd name="connsiteY35" fmla="*/ 6214980 h 6219825"/>
+              <a:gd name="connsiteX36" fmla="*/ 6362294 w 12192000"/>
+              <a:gd name="connsiteY36" fmla="*/ 6219825 h 6219825"/>
+              <a:gd name="connsiteX37" fmla="*/ 6057129 w 12192000"/>
+              <a:gd name="connsiteY37" fmla="*/ 6219825 h 6219825"/>
+              <a:gd name="connsiteX38" fmla="*/ 5977784 w 12192000"/>
+              <a:gd name="connsiteY38" fmla="*/ 6215229 h 6219825"/>
+              <a:gd name="connsiteX39" fmla="*/ 5265087 w 12192000"/>
+              <a:gd name="connsiteY39" fmla="*/ 6178965 h 6219825"/>
+              <a:gd name="connsiteX40" fmla="*/ 4346277 w 12192000"/>
+              <a:gd name="connsiteY40" fmla="*/ 6116869 h 6219825"/>
+              <a:gd name="connsiteX41" fmla="*/ 3373045 w 12192000"/>
+              <a:gd name="connsiteY41" fmla="*/ 6018259 h 6219825"/>
+              <a:gd name="connsiteX42" fmla="*/ 2362173 w 12192000"/>
+              <a:gd name="connsiteY42" fmla="*/ 5899282 h 6219825"/>
+              <a:gd name="connsiteX43" fmla="*/ 1233178 w 12192000"/>
+              <a:gd name="connsiteY43" fmla="*/ 5726033 h 6219825"/>
+              <a:gd name="connsiteX44" fmla="*/ 68500 w 12192000"/>
+              <a:gd name="connsiteY44" fmla="*/ 5486226 h 6219825"/>
+              <a:gd name="connsiteX45" fmla="*/ 0 w 12192000"/>
+              <a:gd name="connsiteY45" fmla="*/ 5468863 h 6219825"/>
+              <a:gd name="connsiteX46" fmla="*/ 0 w 12192000"/>
+              <a:gd name="connsiteY46" fmla="*/ 5412351 h 6219825"/>
+              <a:gd name="connsiteX47" fmla="*/ 72441 w 12192000"/>
+              <a:gd name="connsiteY47" fmla="*/ 5431135 h 6219825"/>
+              <a:gd name="connsiteX48" fmla="*/ 600716 w 12192000"/>
+              <a:gd name="connsiteY48" fmla="*/ 5549555 h 6219825"/>
+              <a:gd name="connsiteX49" fmla="*/ 1769512 w 12192000"/>
+              <a:gd name="connsiteY49" fmla="*/ 5759811 h 6219825"/>
+              <a:gd name="connsiteX50" fmla="*/ 2613554 w 12192000"/>
+              <a:gd name="connsiteY50" fmla="*/ 5876802 h 6219825"/>
+              <a:gd name="connsiteX51" fmla="*/ 2581134 w 12192000"/>
+              <a:gd name="connsiteY51" fmla="*/ 5866867 h 6219825"/>
+              <a:gd name="connsiteX52" fmla="*/ 1112635 w 12192000"/>
+              <a:gd name="connsiteY52" fmla="*/ 5534031 h 6219825"/>
+              <a:gd name="connsiteX53" fmla="*/ 420412 w 12192000"/>
+              <a:gd name="connsiteY53" fmla="*/ 5334514 h 6219825"/>
+              <a:gd name="connsiteX54" fmla="*/ 0 w 12192000"/>
+              <a:gd name="connsiteY54" fmla="*/ 5195539 h 6219825"/>
+              <a:gd name="connsiteX55" fmla="*/ 60 w 12192000"/>
+              <a:gd name="connsiteY55" fmla="*/ 5105401 h 6219825"/>
+              <a:gd name="connsiteX56" fmla="*/ 0 w 12192000"/>
+              <a:gd name="connsiteY56" fmla="*/ 5105401 h 6219825"/>
+              <a:gd name="connsiteX57" fmla="*/ 0 w 12192000"/>
+              <a:gd name="connsiteY57" fmla="*/ 1 h 6219825"/>
+              <a:gd name="connsiteX58" fmla="*/ 9834 w 12192000"/>
+              <a:gd name="connsiteY58" fmla="*/ 1 h 6219825"/>
+            </a:gdLst>
+            <a:ahLst/>
+            <a:cxnLst>
+              <a:cxn ang="0">
+                <a:pos x="connsiteX0" y="connsiteY0"/>
+              </a:cxn>
+              <a:cxn ang="0">
+                <a:pos x="connsiteX1" y="connsiteY1"/>
+              </a:cxn>
+              <a:cxn ang="0">
+                <a:pos x="connsiteX2" y="connsiteY2"/>
+              </a:cxn>
+              <a:cxn ang="0">
+                <a:pos x="connsiteX3" y="connsiteY3"/>
+              </a:cxn>
+              <a:cxn ang="0">
+                <a:pos x="connsiteX4" y="connsiteY4"/>
+              </a:cxn>
+              <a:cxn ang="0">
+                <a:pos x="connsiteX5" y="connsiteY5"/>
+              </a:cxn>
+              <a:cxn ang="0">
+                <a:pos x="connsiteX6" y="connsiteY6"/>
+              </a:cxn>
+              <a:cxn ang="0">
+                <a:pos x="connsiteX7" y="connsiteY7"/>
+              </a:cxn>
+              <a:cxn ang="0">
+                <a:pos x="connsiteX8" y="connsiteY8"/>
+              </a:cxn>
+              <a:cxn ang="0">
+                <a:pos x="connsiteX9" y="connsiteY9"/>
+              </a:cxn>
+              <a:cxn ang="0">
+                <a:pos x="connsiteX10" y="connsiteY10"/>
+              </a:cxn>
+              <a:cxn ang="0">
+                <a:pos x="connsiteX11" y="connsiteY11"/>
+              </a:cxn>
+              <a:cxn ang="0">
+                <a:pos x="connsiteX12" y="connsiteY12"/>
+              </a:cxn>
+              <a:cxn ang="0">
+                <a:pos x="connsiteX13" y="connsiteY13"/>
+              </a:cxn>
+              <a:cxn ang="0">
+                <a:pos x="connsiteX14" y="connsiteY14"/>
+              </a:cxn>
+              <a:cxn ang="0">
+                <a:pos x="connsiteX15" y="connsiteY15"/>
+              </a:cxn>
+              <a:cxn ang="0">
+                <a:pos x="connsiteX16" y="connsiteY16"/>
+              </a:cxn>
+              <a:cxn ang="0">
+                <a:pos x="connsiteX17" y="connsiteY17"/>
+              </a:cxn>
+              <a:cxn ang="0">
+                <a:pos x="connsiteX18" y="connsiteY18"/>
+              </a:cxn>
+              <a:cxn ang="0">
+                <a:pos x="connsiteX19" y="connsiteY19"/>
+              </a:cxn>
+              <a:cxn ang="0">
+                <a:pos x="connsiteX20" y="connsiteY20"/>
+              </a:cxn>
+              <a:cxn ang="0">
+                <a:pos x="connsiteX21" y="connsiteY21"/>
+              </a:cxn>
+              <a:cxn ang="0">
+                <a:pos x="connsiteX22" y="connsiteY22"/>
+              </a:cxn>
+              <a:cxn ang="0">
+                <a:pos x="connsiteX23" y="connsiteY23"/>
+              </a:cxn>
+              <a:cxn ang="0">
+                <a:pos x="connsiteX24" y="connsiteY24"/>
+              </a:cxn>
+              <a:cxn ang="0">
+                <a:pos x="connsiteX25" y="connsiteY25"/>
+              </a:cxn>
+              <a:cxn ang="0">
+                <a:pos x="connsiteX26" y="connsiteY26"/>
+              </a:cxn>
+              <a:cxn ang="0">
+                <a:pos x="connsiteX27" y="connsiteY27"/>
+              </a:cxn>
+              <a:cxn ang="0">
+                <a:pos x="connsiteX28" y="connsiteY28"/>
+              </a:cxn>
+              <a:cxn ang="0">
+                <a:pos x="connsiteX29" y="connsiteY29"/>
+              </a:cxn>
+              <a:cxn ang="0">
+                <a:pos x="connsiteX30" y="connsiteY30"/>
+              </a:cxn>
+              <a:cxn ang="0">
+                <a:pos x="connsiteX31" y="connsiteY31"/>
+              </a:cxn>
+              <a:cxn ang="0">
+                <a:pos x="connsiteX32" y="connsiteY32"/>
+              </a:cxn>
+              <a:cxn ang="0">
+                <a:pos x="connsiteX33" y="connsiteY33"/>
+              </a:cxn>
+              <a:cxn ang="0">
+                <a:pos x="connsiteX34" y="connsiteY34"/>
+              </a:cxn>
+              <a:cxn ang="0">
+                <a:pos x="connsiteX35" y="connsiteY35"/>
+              </a:cxn>
+              <a:cxn ang="0">
+                <a:pos x="connsiteX36" y="connsiteY36"/>
+              </a:cxn>
+              <a:cxn ang="0">
+                <a:pos x="connsiteX37" y="connsiteY37"/>
+              </a:cxn>
+              <a:cxn ang="0">
+                <a:pos x="connsiteX38" y="connsiteY38"/>
+              </a:cxn>
+              <a:cxn ang="0">
+                <a:pos x="connsiteX39" y="connsiteY39"/>
+              </a:cxn>
+              <a:cxn ang="0">
+                <a:pos x="connsiteX40" y="connsiteY40"/>
+              </a:cxn>
+              <a:cxn ang="0">
+                <a:pos x="connsiteX41" y="connsiteY41"/>
+              </a:cxn>
+              <a:cxn ang="0">
+                <a:pos x="connsiteX42" y="connsiteY42"/>
+              </a:cxn>
+              <a:cxn ang="0">
+                <a:pos x="connsiteX43" y="connsiteY43"/>
+              </a:cxn>
+              <a:cxn ang="0">
+                <a:pos x="connsiteX44" y="connsiteY44"/>
+              </a:cxn>
+              <a:cxn ang="0">
+                <a:pos x="connsiteX45" y="connsiteY45"/>
+              </a:cxn>
+              <a:cxn ang="0">
+                <a:pos x="connsiteX46" y="connsiteY46"/>
+              </a:cxn>
+              <a:cxn ang="0">
+                <a:pos x="connsiteX47" y="connsiteY47"/>
+              </a:cxn>
+              <a:cxn ang="0">
+                <a:pos x="connsiteX48" y="connsiteY48"/>
+              </a:cxn>
+              <a:cxn ang="0">
+                <a:pos x="connsiteX49" y="connsiteY49"/>
+              </a:cxn>
+              <a:cxn ang="0">
+                <a:pos x="connsiteX50" y="connsiteY50"/>
+              </a:cxn>
+              <a:cxn ang="0">
+                <a:pos x="connsiteX51" y="connsiteY51"/>
+              </a:cxn>
+              <a:cxn ang="0">
+                <a:pos x="connsiteX52" y="connsiteY52"/>
+              </a:cxn>
+              <a:cxn ang="0">
+                <a:pos x="connsiteX53" y="connsiteY53"/>
+              </a:cxn>
+              <a:cxn ang="0">
+                <a:pos x="connsiteX54" y="connsiteY54"/>
+              </a:cxn>
+              <a:cxn ang="0">
+                <a:pos x="connsiteX55" y="connsiteY55"/>
+              </a:cxn>
+              <a:cxn ang="0">
+                <a:pos x="connsiteX56" y="connsiteY56"/>
+              </a:cxn>
+              <a:cxn ang="0">
+                <a:pos x="connsiteX57" y="connsiteY57"/>
+              </a:cxn>
+              <a:cxn ang="0">
+                <a:pos x="connsiteX58" y="connsiteY58"/>
+              </a:cxn>
+            </a:cxnLst>
+            <a:rect l="l" t="t" r="r" b="b"/>
+            <a:pathLst>
+              <a:path w="12192000" h="6219825">
+                <a:moveTo>
+                  <a:pt x="6789701" y="6151588"/>
+                </a:moveTo>
+                <a:lnTo>
+                  <a:pt x="6788702" y="6151666"/>
+                </a:lnTo>
+                <a:cubicBezTo>
+                  <a:pt x="6788627" y="6151844"/>
+                  <a:pt x="6788551" y="6152022"/>
+                  <a:pt x="6788476" y="6152200"/>
+                </a:cubicBezTo>
+                <a:close/>
+                <a:moveTo>
+                  <a:pt x="9834" y="0"/>
+                </a:moveTo>
+                <a:lnTo>
+                  <a:pt x="12357" y="1"/>
+                </a:lnTo>
+                <a:lnTo>
+                  <a:pt x="12192000" y="1"/>
+                </a:lnTo>
+                <a:lnTo>
+                  <a:pt x="12192000" y="5105401"/>
+                </a:lnTo>
+                <a:lnTo>
+                  <a:pt x="12191716" y="5105401"/>
+                </a:lnTo>
+                <a:lnTo>
+                  <a:pt x="12192000" y="5256977"/>
+                </a:lnTo>
+                <a:lnTo>
+                  <a:pt x="12061096" y="5296034"/>
+                </a:lnTo>
+                <a:cubicBezTo>
+                  <a:pt x="11933500" y="5332263"/>
+                  <a:pt x="11805390" y="5366806"/>
+                  <a:pt x="11676800" y="5399652"/>
+                </a:cubicBezTo>
+                <a:cubicBezTo>
+                  <a:pt x="11262789" y="5507204"/>
+                  <a:pt x="10845343" y="5600846"/>
+                  <a:pt x="10425355" y="5683310"/>
+                </a:cubicBezTo>
+                <a:cubicBezTo>
+                  <a:pt x="10092810" y="5748549"/>
+                  <a:pt x="9759033" y="5806970"/>
+                  <a:pt x="9424022" y="5858546"/>
+                </a:cubicBezTo>
+                <a:cubicBezTo>
+                  <a:pt x="9102997" y="5908224"/>
+                  <a:pt x="8781133" y="5952809"/>
+                  <a:pt x="8458419" y="5992303"/>
+                </a:cubicBezTo>
+                <a:cubicBezTo>
+                  <a:pt x="8211360" y="6022481"/>
+                  <a:pt x="7963792" y="6048065"/>
+                  <a:pt x="7715970" y="6072283"/>
+                </a:cubicBezTo>
+                <a:lnTo>
+                  <a:pt x="6951716" y="6138091"/>
+                </a:lnTo>
+                <a:lnTo>
+                  <a:pt x="6936303" y="6140163"/>
+                </a:lnTo>
+                <a:lnTo>
+                  <a:pt x="6790448" y="6151529"/>
+                </a:lnTo>
+                <a:lnTo>
+                  <a:pt x="6799941" y="6153349"/>
+                </a:lnTo>
+                <a:cubicBezTo>
+                  <a:pt x="6811623" y="6153816"/>
+                  <a:pt x="6823734" y="6151642"/>
+                  <a:pt x="6835432" y="6151642"/>
+                </a:cubicBezTo>
+                <a:cubicBezTo>
+                  <a:pt x="6851580" y="6151642"/>
+                  <a:pt x="6867729" y="6149034"/>
+                  <a:pt x="6884003" y="6148662"/>
+                </a:cubicBezTo>
+                <a:cubicBezTo>
+                  <a:pt x="7115805" y="6143198"/>
+                  <a:pt x="7347351" y="6131026"/>
+                  <a:pt x="7578771" y="6116122"/>
+                </a:cubicBezTo>
+                <a:cubicBezTo>
+                  <a:pt x="7927552" y="6093644"/>
+                  <a:pt x="8276080" y="6065453"/>
+                  <a:pt x="8623845" y="6029188"/>
+                </a:cubicBezTo>
+                <a:cubicBezTo>
+                  <a:pt x="8909939" y="5999878"/>
+                  <a:pt x="9195310" y="5965228"/>
+                  <a:pt x="9479970" y="5925239"/>
+                </a:cubicBezTo>
+                <a:cubicBezTo>
+                  <a:pt x="9864901" y="5870842"/>
+                  <a:pt x="10248014" y="5806101"/>
+                  <a:pt x="10629308" y="5731000"/>
+                </a:cubicBezTo>
+                <a:cubicBezTo>
+                  <a:pt x="11090114" y="5639842"/>
+                  <a:pt x="11546975" y="5532291"/>
+                  <a:pt x="11998498" y="5404869"/>
+                </a:cubicBezTo>
+                <a:lnTo>
+                  <a:pt x="12192000" y="5347846"/>
+                </a:lnTo>
+                <a:lnTo>
+                  <a:pt x="12192000" y="5402606"/>
+                </a:lnTo>
+                <a:lnTo>
+                  <a:pt x="11829257" y="5507950"/>
+                </a:lnTo>
+                <a:cubicBezTo>
+                  <a:pt x="11534769" y="5587680"/>
+                  <a:pt x="11238120" y="5658596"/>
+                  <a:pt x="10939183" y="5722555"/>
+                </a:cubicBezTo>
+                <a:cubicBezTo>
+                  <a:pt x="10622824" y="5790365"/>
+                  <a:pt x="10304941" y="5850387"/>
+                  <a:pt x="9985530" y="5902635"/>
+                </a:cubicBezTo>
+                <a:cubicBezTo>
+                  <a:pt x="9720036" y="5946102"/>
+                  <a:pt x="9453814" y="5984764"/>
+                  <a:pt x="9186882" y="6018631"/>
+                </a:cubicBezTo>
+                <a:cubicBezTo>
+                  <a:pt x="8984197" y="6044216"/>
+                  <a:pt x="8781514" y="6068309"/>
+                  <a:pt x="8578198" y="6088179"/>
+                </a:cubicBezTo>
+                <a:lnTo>
+                  <a:pt x="7864358" y="6149656"/>
+                </a:lnTo>
+                <a:cubicBezTo>
+                  <a:pt x="7554994" y="6172009"/>
+                  <a:pt x="7245502" y="6189895"/>
+                  <a:pt x="6935502" y="6201071"/>
+                </a:cubicBezTo>
+                <a:lnTo>
+                  <a:pt x="6477750" y="6214980"/>
+                </a:lnTo>
+                <a:cubicBezTo>
+                  <a:pt x="6439195" y="6212895"/>
+                  <a:pt x="6400529" y="6214521"/>
+                  <a:pt x="6362294" y="6219825"/>
+                </a:cubicBezTo>
+                <a:lnTo>
+                  <a:pt x="6057129" y="6219825"/>
+                </a:lnTo>
+                <a:lnTo>
+                  <a:pt x="5977784" y="6215229"/>
+                </a:lnTo>
+                <a:lnTo>
+                  <a:pt x="5265087" y="6178965"/>
+                </a:lnTo>
+                <a:cubicBezTo>
+                  <a:pt x="4958267" y="6166544"/>
+                  <a:pt x="4651826" y="6146055"/>
+                  <a:pt x="4346277" y="6116869"/>
+                </a:cubicBezTo>
+                <a:lnTo>
+                  <a:pt x="3373045" y="6018259"/>
+                </a:lnTo>
+                <a:cubicBezTo>
+                  <a:pt x="3035412" y="5983982"/>
+                  <a:pt x="2698456" y="5944327"/>
+                  <a:pt x="2362173" y="5899282"/>
+                </a:cubicBezTo>
+                <a:cubicBezTo>
+                  <a:pt x="1984692" y="5849108"/>
+                  <a:pt x="1608364" y="5791358"/>
+                  <a:pt x="1233178" y="5726033"/>
+                </a:cubicBezTo>
+                <a:cubicBezTo>
+                  <a:pt x="842181" y="5657291"/>
+                  <a:pt x="453758" y="5578770"/>
+                  <a:pt x="68500" y="5486226"/>
+                </a:cubicBezTo>
+                <a:lnTo>
+                  <a:pt x="0" y="5468863"/>
+                </a:lnTo>
+                <a:lnTo>
+                  <a:pt x="0" y="5412351"/>
+                </a:lnTo>
+                <a:lnTo>
+                  <a:pt x="72441" y="5431135"/>
+                </a:lnTo>
+                <a:cubicBezTo>
+                  <a:pt x="247961" y="5473331"/>
+                  <a:pt x="424164" y="5512608"/>
+                  <a:pt x="600716" y="5549555"/>
+                </a:cubicBezTo>
+                <a:cubicBezTo>
+                  <a:pt x="988279" y="5630403"/>
+                  <a:pt x="1378133" y="5699330"/>
+                  <a:pt x="1769512" y="5759811"/>
+                </a:cubicBezTo>
+                <a:cubicBezTo>
+                  <a:pt x="2052426" y="5803406"/>
+                  <a:pt x="2335725" y="5843519"/>
+                  <a:pt x="2613554" y="5876802"/>
+                </a:cubicBezTo>
+                <a:cubicBezTo>
+                  <a:pt x="2605544" y="5879410"/>
+                  <a:pt x="2594611" y="5869350"/>
+                  <a:pt x="2581134" y="5866867"/>
+                </a:cubicBezTo>
+                <a:cubicBezTo>
+                  <a:pt x="2087178" y="5774877"/>
+                  <a:pt x="1597684" y="5663937"/>
+                  <a:pt x="1112635" y="5534031"/>
+                </a:cubicBezTo>
+                <a:cubicBezTo>
+                  <a:pt x="880453" y="5471934"/>
+                  <a:pt x="649713" y="5405428"/>
+                  <a:pt x="420412" y="5334514"/>
+                </a:cubicBezTo>
+                <a:lnTo>
+                  <a:pt x="0" y="5195539"/>
+                </a:lnTo>
+                <a:lnTo>
+                  <a:pt x="60" y="5105401"/>
+                </a:lnTo>
+                <a:lnTo>
+                  <a:pt x="0" y="5105401"/>
+                </a:lnTo>
+                <a:lnTo>
+                  <a:pt x="0" y="1"/>
+                </a:lnTo>
+                <a:lnTo>
+                  <a:pt x="9834" y="1"/>
+                </a:lnTo>
+                <a:close/>
+              </a:path>
+            </a:pathLst>
+          </a:custGeom>
+          <a:solidFill>
+            <a:schemeClr val="bg1"/>
+          </a:solidFill>
+          <a:ln>
+            <a:noFill/>
+          </a:ln>
+        </p:spPr>
+        <p:style>
+          <a:lnRef idx="2">
+            <a:schemeClr val="accent1">
+              <a:shade val="50000"/>
+            </a:schemeClr>
+          </a:lnRef>
+          <a:fillRef idx="1">
+            <a:schemeClr val="accent1"/>
+          </a:fillRef>
+          <a:effectRef idx="0">
+            <a:schemeClr val="accent1"/>
+          </a:effectRef>
+          <a:fontRef idx="minor">
+            <a:schemeClr val="lt1"/>
+          </a:fontRef>
+        </p:style>
+        <p:txBody>
+          <a:bodyPr wrap="square" rtlCol="0" anchor="ctr">
+            <a:noAutofit/>
+          </a:bodyPr>
+          <a:lstStyle/>
+          <a:p>
+            <a:pPr algn="ctr"/>
+            <a:endParaRPr lang="en-US"/>
+          </a:p>
+        </p:txBody>
+      </p:sp>
+      <p:pic>
+        <p:nvPicPr>
+          <p:cNvPr id="9" name="Picture 8" descr="Graphical user interface, text&#10;&#10;Description automatically generated with medium confidence">
+            <a:extLst>
+              <a:ext uri="{FF2B5EF4-FFF2-40B4-BE49-F238E27FC236}">
+                <a16:creationId xmlns:a16="http://schemas.microsoft.com/office/drawing/2014/main" id="{3FB27076-2C3A-77C9-BB90-86708CA9B3D5}"/>
+              </a:ext>
+            </a:extLst>
+          </p:cNvPr>
+          <p:cNvPicPr>
+            <a:picLocks noChangeAspect="1"/>
+          </p:cNvPicPr>
+          <p:nvPr/>
+        </p:nvPicPr>
+        <p:blipFill>
+          <a:blip r:embed="rId2"/>
+          <a:stretch>
+            <a:fillRect/>
+          </a:stretch>
+        </p:blipFill>
+        <p:spPr>
+          <a:xfrm>
+            <a:off x="298599" y="228600"/>
+            <a:ext cx="11518602" cy="4953000"/>
+          </a:xfrm>
+          <a:prstGeom prst="rect">
+            <a:avLst/>
+          </a:prstGeom>
+        </p:spPr>
+      </p:pic>
     </p:spTree>
     <p:extLst>
       <p:ext uri="{BB962C8B-B14F-4D97-AF65-F5344CB8AC3E}">
@@ -3431,7 +4134,7 @@
           <p:cNvPr id="2" name="slide2" descr="Story1">
             <a:extLst>
               <a:ext uri="{FF2B5EF4-FFF2-40B4-BE49-F238E27FC236}">
-                <a16:creationId xmlns:a16="http://schemas.microsoft.com/office/drawing/2014/main" id="{86A6B430-456F-4847-8197-A95E8A4C5790}"/>
+                <a16:creationId xmlns:a16="http://schemas.microsoft.com/office/drawing/2014/main" id="{150F8C0A-B26F-4D25-B230-30B3B6D210AB}"/>
               </a:ext>
             </a:extLst>
           </p:cNvPr>
@@ -3497,7 +4200,7 @@
           <p:cNvPr id="3" name="slide3" descr="Story2">
             <a:extLst>
               <a:ext uri="{FF2B5EF4-FFF2-40B4-BE49-F238E27FC236}">
-                <a16:creationId xmlns:a16="http://schemas.microsoft.com/office/drawing/2014/main" id="{0ABC146F-8579-47B6-8FF1-2AF1C323C9C5}"/>
+                <a16:creationId xmlns:a16="http://schemas.microsoft.com/office/drawing/2014/main" id="{D0D64941-F673-4428-A15B-D77A692A5D20}"/>
               </a:ext>
             </a:extLst>
           </p:cNvPr>
@@ -3563,7 +4266,7 @@
           <p:cNvPr id="4" name="slide4" descr="Story3">
             <a:extLst>
               <a:ext uri="{FF2B5EF4-FFF2-40B4-BE49-F238E27FC236}">
-                <a16:creationId xmlns:a16="http://schemas.microsoft.com/office/drawing/2014/main" id="{249866A9-127A-4B61-ACF7-FD296C0D1795}"/>
+                <a16:creationId xmlns:a16="http://schemas.microsoft.com/office/drawing/2014/main" id="{4BEA6C3B-BA5D-42B4-AD39-3A1ED6928635}"/>
               </a:ext>
             </a:extLst>
           </p:cNvPr>
@@ -3629,7 +4332,7 @@
           <p:cNvPr id="5" name="slide5" descr="Story4">
             <a:extLst>
               <a:ext uri="{FF2B5EF4-FFF2-40B4-BE49-F238E27FC236}">
-                <a16:creationId xmlns:a16="http://schemas.microsoft.com/office/drawing/2014/main" id="{A88A3A27-07A4-4138-8D03-E5E76E6E3E26}"/>
+                <a16:creationId xmlns:a16="http://schemas.microsoft.com/office/drawing/2014/main" id="{15D1D063-1C17-455C-99B7-05EBB8FBAC1C}"/>
               </a:ext>
             </a:extLst>
           </p:cNvPr>
@@ -3695,7 +4398,7 @@
           <p:cNvPr id="6" name="slide6" descr="Story5">
             <a:extLst>
               <a:ext uri="{FF2B5EF4-FFF2-40B4-BE49-F238E27FC236}">
-                <a16:creationId xmlns:a16="http://schemas.microsoft.com/office/drawing/2014/main" id="{5D4A4322-5CEF-422F-B1D1-883FA8B1D6E9}"/>
+                <a16:creationId xmlns:a16="http://schemas.microsoft.com/office/drawing/2014/main" id="{1C06FC88-8393-44BA-896F-799A50831C76}"/>
               </a:ext>
             </a:extLst>
           </p:cNvPr>

</xml_diff>